<commit_message>
Final version StegLove with disain
</commit_message>
<xml_diff>
--- a/DiplomWork/Steglove.pptx
+++ b/DiplomWork/Steglove.pptx
@@ -347,7 +347,7 @@
           <a:p>
             <a:fld id="{2BBFE750-688D-4FBF-8B81-C13CBB42B7D8}" type="datetimeFigureOut">
               <a:rPr lang="ru-RU" smtClean="0"/>
-              <a:t>29.12.2023</a:t>
+              <a:t>19.01.2024</a:t>
             </a:fld>
             <a:endParaRPr lang="ru-RU"/>
           </a:p>
@@ -612,7 +612,7 @@
           <a:p>
             <a:fld id="{2BBFE750-688D-4FBF-8B81-C13CBB42B7D8}" type="datetimeFigureOut">
               <a:rPr lang="ru-RU" smtClean="0"/>
-              <a:t>29.12.2023</a:t>
+              <a:t>19.01.2024</a:t>
             </a:fld>
             <a:endParaRPr lang="ru-RU"/>
           </a:p>
@@ -787,7 +787,7 @@
           <a:p>
             <a:fld id="{2BBFE750-688D-4FBF-8B81-C13CBB42B7D8}" type="datetimeFigureOut">
               <a:rPr lang="ru-RU" smtClean="0"/>
-              <a:t>29.12.2023</a:t>
+              <a:t>19.01.2024</a:t>
             </a:fld>
             <a:endParaRPr lang="ru-RU"/>
           </a:p>
@@ -952,7 +952,7 @@
           <a:p>
             <a:fld id="{2BBFE750-688D-4FBF-8B81-C13CBB42B7D8}" type="datetimeFigureOut">
               <a:rPr lang="ru-RU" smtClean="0"/>
-              <a:t>29.12.2023</a:t>
+              <a:t>19.01.2024</a:t>
             </a:fld>
             <a:endParaRPr lang="ru-RU"/>
           </a:p>
@@ -1201,7 +1201,7 @@
           <a:p>
             <a:fld id="{2BBFE750-688D-4FBF-8B81-C13CBB42B7D8}" type="datetimeFigureOut">
               <a:rPr lang="ru-RU" smtClean="0"/>
-              <a:t>29.12.2023</a:t>
+              <a:t>19.01.2024</a:t>
             </a:fld>
             <a:endParaRPr lang="ru-RU"/>
           </a:p>
@@ -1484,7 +1484,7 @@
           <a:p>
             <a:fld id="{2BBFE750-688D-4FBF-8B81-C13CBB42B7D8}" type="datetimeFigureOut">
               <a:rPr lang="ru-RU" smtClean="0"/>
-              <a:t>29.12.2023</a:t>
+              <a:t>19.01.2024</a:t>
             </a:fld>
             <a:endParaRPr lang="ru-RU"/>
           </a:p>
@@ -1923,7 +1923,7 @@
           <a:p>
             <a:fld id="{2BBFE750-688D-4FBF-8B81-C13CBB42B7D8}" type="datetimeFigureOut">
               <a:rPr lang="ru-RU" smtClean="0"/>
-              <a:t>29.12.2023</a:t>
+              <a:t>19.01.2024</a:t>
             </a:fld>
             <a:endParaRPr lang="ru-RU"/>
           </a:p>
@@ -2036,7 +2036,7 @@
           <a:p>
             <a:fld id="{2BBFE750-688D-4FBF-8B81-C13CBB42B7D8}" type="datetimeFigureOut">
               <a:rPr lang="ru-RU" smtClean="0"/>
-              <a:t>29.12.2023</a:t>
+              <a:t>19.01.2024</a:t>
             </a:fld>
             <a:endParaRPr lang="ru-RU"/>
           </a:p>
@@ -2126,7 +2126,7 @@
           <a:p>
             <a:fld id="{2BBFE750-688D-4FBF-8B81-C13CBB42B7D8}" type="datetimeFigureOut">
               <a:rPr lang="ru-RU" smtClean="0"/>
-              <a:t>29.12.2023</a:t>
+              <a:t>19.01.2024</a:t>
             </a:fld>
             <a:endParaRPr lang="ru-RU"/>
           </a:p>
@@ -2368,7 +2368,7 @@
           <a:p>
             <a:fld id="{2BBFE750-688D-4FBF-8B81-C13CBB42B7D8}" type="datetimeFigureOut">
               <a:rPr lang="ru-RU" smtClean="0"/>
-              <a:t>29.12.2023</a:t>
+              <a:t>19.01.2024</a:t>
             </a:fld>
             <a:endParaRPr lang="ru-RU"/>
           </a:p>
@@ -2662,7 +2662,7 @@
           <a:p>
             <a:fld id="{2BBFE750-688D-4FBF-8B81-C13CBB42B7D8}" type="datetimeFigureOut">
               <a:rPr lang="ru-RU" smtClean="0"/>
-              <a:t>29.12.2023</a:t>
+              <a:t>19.01.2024</a:t>
             </a:fld>
             <a:endParaRPr lang="ru-RU"/>
           </a:p>
@@ -2956,7 +2956,7 @@
           <a:p>
             <a:fld id="{2BBFE750-688D-4FBF-8B81-C13CBB42B7D8}" type="datetimeFigureOut">
               <a:rPr lang="ru-RU" smtClean="0"/>
-              <a:t>29.12.2023</a:t>
+              <a:t>19.01.2024</a:t>
             </a:fld>
             <a:endParaRPr lang="ru-RU"/>
           </a:p>
@@ -3599,7 +3599,7 @@
             </a:r>
             <a:r>
               <a:rPr lang="ru-RU" dirty="0"/>
-              <a:t>оптимизация времени поиска утилит</a:t>
+              <a:t>Помощь в изучении Стеганографии</a:t>
             </a:r>
           </a:p>
         </p:txBody>
@@ -4133,14 +4133,26 @@
               <a:buChar char="•"/>
             </a:pPr>
             <a:r>
-              <a:rPr lang="ru-RU" dirty="0"/>
+              <a:rPr lang="ru-RU" dirty="0">
+                <a:highlight>
+                  <a:srgbClr val="FFFF00"/>
+                </a:highlight>
+              </a:rPr>
               <a:t>Встроить код на С++ в </a:t>
             </a:r>
             <a:r>
-              <a:rPr lang="en-US" dirty="0"/>
+              <a:rPr lang="en-US" dirty="0">
+                <a:highlight>
+                  <a:srgbClr val="FFFF00"/>
+                </a:highlight>
+              </a:rPr>
               <a:t>Qt</a:t>
             </a:r>
-            <a:endParaRPr lang="ru-RU" dirty="0"/>
+            <a:endParaRPr lang="ru-RU" dirty="0">
+              <a:highlight>
+                <a:srgbClr val="FFFF00"/>
+              </a:highlight>
+            </a:endParaRPr>
           </a:p>
           <a:p>
             <a:pPr marL="342900" indent="-342900">
@@ -4148,7 +4160,11 @@
               <a:buChar char="•"/>
             </a:pPr>
             <a:r>
-              <a:rPr lang="ru-RU" dirty="0"/>
+              <a:rPr lang="ru-RU" dirty="0">
+                <a:highlight>
+                  <a:srgbClr val="FFFF00"/>
+                </a:highlight>
+              </a:rPr>
               <a:t>Расширить код добавив в нем чтение из списка по формату</a:t>
             </a:r>
           </a:p>
@@ -4158,7 +4174,11 @@
               <a:buChar char="•"/>
             </a:pPr>
             <a:r>
-              <a:rPr lang="ru-RU" dirty="0"/>
+              <a:rPr lang="ru-RU" dirty="0">
+                <a:highlight>
+                  <a:srgbClr val="FFFF00"/>
+                </a:highlight>
+              </a:rPr>
               <a:t>Построить меню приложения</a:t>
             </a:r>
           </a:p>
@@ -4168,17 +4188,33 @@
               <a:buChar char="•"/>
             </a:pPr>
             <a:r>
-              <a:rPr lang="ru-RU" dirty="0"/>
+              <a:rPr lang="ru-RU" dirty="0">
+                <a:highlight>
+                  <a:srgbClr val="FFFF00"/>
+                </a:highlight>
+              </a:rPr>
               <a:t>Сдать работу на оценку знакомым в </a:t>
             </a:r>
             <a:br>
-              <a:rPr lang="ru-RU" dirty="0"/>
+              <a:rPr lang="ru-RU" dirty="0">
+                <a:highlight>
+                  <a:srgbClr val="FFFF00"/>
+                </a:highlight>
+              </a:rPr>
             </a:br>
             <a:r>
-              <a:rPr lang="ru-RU" dirty="0"/>
+              <a:rPr lang="ru-RU" dirty="0">
+                <a:highlight>
+                  <a:srgbClr val="FFFF00"/>
+                </a:highlight>
+              </a:rPr>
               <a:t>этой области</a:t>
             </a:r>
-            <a:endParaRPr lang="en-US" dirty="0"/>
+            <a:endParaRPr lang="en-US" dirty="0">
+              <a:highlight>
+                <a:srgbClr val="FFFF00"/>
+              </a:highlight>
+            </a:endParaRPr>
           </a:p>
           <a:p>
             <a:pPr marL="342900" indent="-342900">
@@ -4281,95 +4317,40 @@
       </p:sp>
       <p:pic>
         <p:nvPicPr>
-          <p:cNvPr id="3080" name="Picture 8">
+          <p:cNvPr id="9" name="Рисунок 8">
             <a:extLst>
               <a:ext uri="{FF2B5EF4-FFF2-40B4-BE49-F238E27FC236}">
-                <a16:creationId xmlns:a16="http://schemas.microsoft.com/office/drawing/2014/main" id="{A6736366-47EB-43E3-A47F-0E035D2D2A96}"/>
+                <a16:creationId xmlns:a16="http://schemas.microsoft.com/office/drawing/2014/main" id="{83AFD9DC-2AC2-4E7F-BA70-9A7E157516BE}"/>
               </a:ext>
             </a:extLst>
           </p:cNvPr>
           <p:cNvPicPr>
-            <a:picLocks noChangeAspect="1" noChangeArrowheads="1"/>
+            <a:picLocks noChangeAspect="1"/>
           </p:cNvPicPr>
           <p:nvPr/>
         </p:nvPicPr>
         <p:blipFill>
-          <a:blip r:embed="rId3">
+          <a:blip r:embed="rId3" cstate="print">
             <a:extLst>
               <a:ext uri="{28A0092B-C50C-407E-A947-70E740481C1C}">
                 <a14:useLocalDpi xmlns:a14="http://schemas.microsoft.com/office/drawing/2010/main" val="0"/>
               </a:ext>
             </a:extLst>
           </a:blip>
-          <a:srcRect/>
           <a:stretch>
             <a:fillRect/>
           </a:stretch>
         </p:blipFill>
-        <p:spPr bwMode="auto">
+        <p:spPr>
           <a:xfrm>
-            <a:off x="6300519" y="127141"/>
-            <a:ext cx="2543339" cy="2543339"/>
+            <a:off x="5304490" y="152718"/>
+            <a:ext cx="3356992" cy="3356992"/>
           </a:xfrm>
           <a:prstGeom prst="rect">
             <a:avLst/>
           </a:prstGeom>
-          <a:noFill/>
-          <a:extLst>
-            <a:ext uri="{909E8E84-426E-40DD-AFC4-6F175D3DCCD1}">
-              <a14:hiddenFill xmlns:a14="http://schemas.microsoft.com/office/drawing/2010/main">
-                <a:solidFill>
-                  <a:srgbClr val="FFFFFF"/>
-                </a:solidFill>
-              </a14:hiddenFill>
-            </a:ext>
-          </a:extLst>
         </p:spPr>
       </p:pic>
-      <p:cxnSp>
-        <p:nvCxnSpPr>
-          <p:cNvPr id="7" name="Соединитель: уступ 6">
-            <a:extLst>
-              <a:ext uri="{FF2B5EF4-FFF2-40B4-BE49-F238E27FC236}">
-                <a16:creationId xmlns:a16="http://schemas.microsoft.com/office/drawing/2014/main" id="{A80C2BC6-B01A-4053-92C7-8192295B8571}"/>
-              </a:ext>
-            </a:extLst>
-          </p:cNvPr>
-          <p:cNvCxnSpPr>
-            <a:cxnSpLocks/>
-            <a:endCxn id="3080" idx="1"/>
-          </p:cNvCxnSpPr>
-          <p:nvPr/>
-        </p:nvCxnSpPr>
-        <p:spPr>
-          <a:xfrm flipV="1">
-            <a:off x="4067944" y="1398811"/>
-            <a:ext cx="2232575" cy="1054954"/>
-          </a:xfrm>
-          <a:prstGeom prst="bentConnector3">
-            <a:avLst>
-              <a:gd name="adj1" fmla="val 68361"/>
-            </a:avLst>
-          </a:prstGeom>
-          <a:ln w="38100">
-            <a:tailEnd type="triangle"/>
-          </a:ln>
-        </p:spPr>
-        <p:style>
-          <a:lnRef idx="1">
-            <a:schemeClr val="dk1"/>
-          </a:lnRef>
-          <a:fillRef idx="0">
-            <a:schemeClr val="dk1"/>
-          </a:fillRef>
-          <a:effectRef idx="0">
-            <a:schemeClr val="dk1"/>
-          </a:effectRef>
-          <a:fontRef idx="minor">
-            <a:schemeClr val="tx1"/>
-          </a:fontRef>
-        </p:style>
-      </p:cxnSp>
     </p:spTree>
     <p:extLst>
       <p:ext uri="{BB962C8B-B14F-4D97-AF65-F5344CB8AC3E}">

</xml_diff>